<commit_message>
Update Metodologias de Desenvolvimento de Software.pptx
</commit_message>
<xml_diff>
--- a/doc/Metodologias de Desenvolvimento de Software.pptx
+++ b/doc/Metodologias de Desenvolvimento de Software.pptx
@@ -124,16 +124,47 @@
 </p:presentation>
 </file>
 
-<file path=ppt/revisionInfo.xml><?xml version="1.0" encoding="utf-8"?>
-<p1510:revInfo xmlns:a="http://schemas.openxmlformats.org/drawingml/2006/main" xmlns:r="http://schemas.openxmlformats.org/officeDocument/2006/relationships" xmlns:p1510="http://schemas.microsoft.com/office/powerpoint/2015/10/main">
-  <p1510:revLst>
-    <p1510:client id="{2B8B0255-B0D7-4CA7-8CAC-A9D7D3C0ADDD}" v="7" dt="2023-05-23T20:29:16.148"/>
-  </p1510:revLst>
-</p1510:revInfo>
-</file>
-
 <file path=ppt/changesInfos/changesInfo1.xml><?xml version="1.0" encoding="utf-8"?>
 <pc:chgInfo xmlns:a="http://schemas.openxmlformats.org/drawingml/2006/main" xmlns:r="http://schemas.openxmlformats.org/officeDocument/2006/relationships" xmlns:ac="http://schemas.microsoft.com/office/drawing/2013/main/command" xmlns:pc="http://schemas.microsoft.com/office/powerpoint/2013/main/command">
+  <pc:docChgLst>
+    <pc:chgData name="David Domingues" userId="a54dc4084bcdf8b4" providerId="LiveId" clId="{E9FD9D25-AF06-4830-B2B2-6F3871255D5A}"/>
+    <pc:docChg chg="custSel modSld">
+      <pc:chgData name="David Domingues" userId="a54dc4084bcdf8b4" providerId="LiveId" clId="{E9FD9D25-AF06-4830-B2B2-6F3871255D5A}" dt="2023-05-24T23:37:16.094" v="357" actId="20577"/>
+      <pc:docMkLst>
+        <pc:docMk/>
+      </pc:docMkLst>
+      <pc:sldChg chg="modSp mod">
+        <pc:chgData name="David Domingues" userId="a54dc4084bcdf8b4" providerId="LiveId" clId="{E9FD9D25-AF06-4830-B2B2-6F3871255D5A}" dt="2023-05-24T23:36:29.048" v="356" actId="20577"/>
+        <pc:sldMkLst>
+          <pc:docMk/>
+          <pc:sldMk cId="841685169" sldId="257"/>
+        </pc:sldMkLst>
+        <pc:spChg chg="mod">
+          <ac:chgData name="David Domingues" userId="a54dc4084bcdf8b4" providerId="LiveId" clId="{E9FD9D25-AF06-4830-B2B2-6F3871255D5A}" dt="2023-05-24T23:36:29.048" v="356" actId="20577"/>
+          <ac:spMkLst>
+            <pc:docMk/>
+            <pc:sldMk cId="841685169" sldId="257"/>
+            <ac:spMk id="3" creationId="{ED897CA6-F69C-9979-8297-BAE5E1C8ABC7}"/>
+          </ac:spMkLst>
+        </pc:spChg>
+      </pc:sldChg>
+      <pc:sldChg chg="modSp mod">
+        <pc:chgData name="David Domingues" userId="a54dc4084bcdf8b4" providerId="LiveId" clId="{E9FD9D25-AF06-4830-B2B2-6F3871255D5A}" dt="2023-05-24T23:37:16.094" v="357" actId="20577"/>
+        <pc:sldMkLst>
+          <pc:docMk/>
+          <pc:sldMk cId="667560872" sldId="259"/>
+        </pc:sldMkLst>
+        <pc:spChg chg="mod">
+          <ac:chgData name="David Domingues" userId="a54dc4084bcdf8b4" providerId="LiveId" clId="{E9FD9D25-AF06-4830-B2B2-6F3871255D5A}" dt="2023-05-24T23:37:16.094" v="357" actId="20577"/>
+          <ac:spMkLst>
+            <pc:docMk/>
+            <pc:sldMk cId="667560872" sldId="259"/>
+            <ac:spMk id="8" creationId="{C2DAC2E3-FC3F-E243-0E5A-86E3085435A0}"/>
+          </ac:spMkLst>
+        </pc:spChg>
+      </pc:sldChg>
+    </pc:docChg>
+  </pc:docChgLst>
   <pc:docChgLst>
     <pc:chgData name="David Domingues" userId="a54dc4084bcdf8b4" providerId="LiveId" clId="{2B8B0255-B0D7-4CA7-8CAC-A9D7D3C0ADDD}"/>
     <pc:docChg chg="undo custSel addSld modSld">
@@ -599,7 +630,7 @@
           <a:p>
             <a:fld id="{F53EB8C1-758A-422C-8847-F56C6597B443}" type="datetimeFigureOut">
               <a:rPr lang="pt-PT" smtClean="0"/>
-              <a:t>23/05/2023</a:t>
+              <a:t>25/05/2023</a:t>
             </a:fld>
             <a:endParaRPr lang="pt-PT"/>
           </a:p>
@@ -929,7 +960,7 @@
           <a:p>
             <a:fld id="{F53EB8C1-758A-422C-8847-F56C6597B443}" type="datetimeFigureOut">
               <a:rPr lang="pt-PT" smtClean="0"/>
-              <a:t>23/05/2023</a:t>
+              <a:t>25/05/2023</a:t>
             </a:fld>
             <a:endParaRPr lang="pt-PT"/>
           </a:p>
@@ -1109,7 +1140,7 @@
           <a:p>
             <a:fld id="{F53EB8C1-758A-422C-8847-F56C6597B443}" type="datetimeFigureOut">
               <a:rPr lang="pt-PT" smtClean="0"/>
-              <a:t>23/05/2023</a:t>
+              <a:t>25/05/2023</a:t>
             </a:fld>
             <a:endParaRPr lang="pt-PT"/>
           </a:p>
@@ -1279,7 +1310,7 @@
           <a:p>
             <a:fld id="{F53EB8C1-758A-422C-8847-F56C6597B443}" type="datetimeFigureOut">
               <a:rPr lang="pt-PT" smtClean="0"/>
-              <a:t>23/05/2023</a:t>
+              <a:t>25/05/2023</a:t>
             </a:fld>
             <a:endParaRPr lang="pt-PT"/>
           </a:p>
@@ -1556,7 +1587,7 @@
           <a:p>
             <a:fld id="{F53EB8C1-758A-422C-8847-F56C6597B443}" type="datetimeFigureOut">
               <a:rPr lang="pt-PT" smtClean="0"/>
-              <a:t>23/05/2023</a:t>
+              <a:t>25/05/2023</a:t>
             </a:fld>
             <a:endParaRPr lang="pt-PT"/>
           </a:p>
@@ -1950,7 +1981,7 @@
           <a:p>
             <a:fld id="{F53EB8C1-758A-422C-8847-F56C6597B443}" type="datetimeFigureOut">
               <a:rPr lang="pt-PT" smtClean="0"/>
-              <a:t>23/05/2023</a:t>
+              <a:t>25/05/2023</a:t>
             </a:fld>
             <a:endParaRPr lang="pt-PT"/>
           </a:p>
@@ -2427,7 +2458,7 @@
           <a:p>
             <a:fld id="{F53EB8C1-758A-422C-8847-F56C6597B443}" type="datetimeFigureOut">
               <a:rPr lang="pt-PT" smtClean="0"/>
-              <a:t>23/05/2023</a:t>
+              <a:t>25/05/2023</a:t>
             </a:fld>
             <a:endParaRPr lang="pt-PT"/>
           </a:p>
@@ -2545,7 +2576,7 @@
           <a:p>
             <a:fld id="{F53EB8C1-758A-422C-8847-F56C6597B443}" type="datetimeFigureOut">
               <a:rPr lang="pt-PT" smtClean="0"/>
-              <a:t>23/05/2023</a:t>
+              <a:t>25/05/2023</a:t>
             </a:fld>
             <a:endParaRPr lang="pt-PT"/>
           </a:p>
@@ -2640,7 +2671,7 @@
           <a:p>
             <a:fld id="{F53EB8C1-758A-422C-8847-F56C6597B443}" type="datetimeFigureOut">
               <a:rPr lang="pt-PT" smtClean="0"/>
-              <a:t>23/05/2023</a:t>
+              <a:t>25/05/2023</a:t>
             </a:fld>
             <a:endParaRPr lang="pt-PT"/>
           </a:p>
@@ -2986,7 +3017,7 @@
           <a:p>
             <a:fld id="{F53EB8C1-758A-422C-8847-F56C6597B443}" type="datetimeFigureOut">
               <a:rPr lang="pt-PT" smtClean="0"/>
-              <a:t>23/05/2023</a:t>
+              <a:t>25/05/2023</a:t>
             </a:fld>
             <a:endParaRPr lang="pt-PT"/>
           </a:p>
@@ -3374,7 +3405,7 @@
           <a:p>
             <a:fld id="{F53EB8C1-758A-422C-8847-F56C6597B443}" type="datetimeFigureOut">
               <a:rPr lang="pt-PT" smtClean="0"/>
-              <a:t>23/05/2023</a:t>
+              <a:t>25/05/2023</a:t>
             </a:fld>
             <a:endParaRPr lang="pt-PT"/>
           </a:p>
@@ -3652,7 +3683,7 @@
           <a:p>
             <a:fld id="{F53EB8C1-758A-422C-8847-F56C6597B443}" type="datetimeFigureOut">
               <a:rPr lang="pt-PT" smtClean="0"/>
-              <a:t>23/05/2023</a:t>
+              <a:t>25/05/2023</a:t>
             </a:fld>
             <a:endParaRPr lang="pt-PT"/>
           </a:p>
@@ -4610,13 +4641,13 @@
   <p:clrMapOvr>
     <a:masterClrMapping/>
   </p:clrMapOvr>
-  <mc:AlternateContent xmlns:mc="http://schemas.openxmlformats.org/markup-compatibility/2006">
-    <mc:Choice xmlns:p14="http://schemas.microsoft.com/office/powerpoint/2010/main" Requires="p14">
+  <mc:AlternateContent xmlns:mc="http://schemas.openxmlformats.org/markup-compatibility/2006" xmlns:p14="http://schemas.microsoft.com/office/powerpoint/2010/main">
+    <mc:Choice Requires="p14">
       <p:transition spd="slow" p14:dur="3400">
         <p14:reveal/>
       </p:transition>
     </mc:Choice>
-    <mc:Fallback>
+    <mc:Fallback xmlns="">
       <p:transition spd="slow">
         <p:fade/>
       </p:transition>
@@ -5072,14 +5103,148 @@
           <a:lstStyle/>
           <a:p>
             <a:r>
+              <a:rPr lang="en-GB" dirty="0"/>
+              <a:t>O </a:t>
+            </a:r>
+            <a:r>
               <a:rPr lang="en-GB" dirty="0" err="1"/>
-              <a:t>Objetivos</a:t>
+              <a:t>projeto</a:t>
             </a:r>
             <a:r>
               <a:rPr lang="en-GB" dirty="0"/>
-              <a:t>				 </a:t>
-            </a:r>
-            <a:endParaRPr lang="pt-PT" dirty="0"/>
+              <a:t> da </a:t>
+            </a:r>
+            <a:r>
+              <a:rPr lang="en-GB" dirty="0" err="1"/>
+              <a:t>Unidade</a:t>
+            </a:r>
+            <a:r>
+              <a:rPr lang="en-GB" dirty="0"/>
+              <a:t> Curricular </a:t>
+            </a:r>
+            <a:r>
+              <a:rPr lang="en-GB" dirty="0" err="1"/>
+              <a:t>Metodologias</a:t>
+            </a:r>
+            <a:r>
+              <a:rPr lang="en-GB" dirty="0"/>
+              <a:t> de </a:t>
+            </a:r>
+            <a:r>
+              <a:rPr lang="en-GB" dirty="0" err="1"/>
+              <a:t>Desenvilvimento</a:t>
+            </a:r>
+            <a:r>
+              <a:rPr lang="en-GB" dirty="0"/>
+              <a:t> de Software </a:t>
+            </a:r>
+            <a:r>
+              <a:rPr lang="en-GB" dirty="0" err="1"/>
+              <a:t>consiste</a:t>
+            </a:r>
+            <a:r>
+              <a:rPr lang="en-GB" dirty="0"/>
+              <a:t> </a:t>
+            </a:r>
+            <a:r>
+              <a:rPr lang="en-GB" dirty="0" err="1"/>
+              <a:t>na</a:t>
+            </a:r>
+            <a:r>
+              <a:rPr lang="en-GB" dirty="0"/>
+              <a:t> </a:t>
+            </a:r>
+            <a:r>
+              <a:rPr lang="en-GB" dirty="0" err="1"/>
+              <a:t>gestão</a:t>
+            </a:r>
+            <a:r>
+              <a:rPr lang="en-GB" dirty="0"/>
+              <a:t> dos </a:t>
+            </a:r>
+            <a:r>
+              <a:rPr lang="en-GB" dirty="0" err="1"/>
+              <a:t>projetos</a:t>
+            </a:r>
+            <a:r>
+              <a:rPr lang="en-GB" dirty="0"/>
+              <a:t> das UC’s de </a:t>
+            </a:r>
+            <a:r>
+              <a:rPr lang="en-GB" dirty="0" err="1"/>
+              <a:t>Desenvolvimento</a:t>
+            </a:r>
+            <a:r>
+              <a:rPr lang="en-GB" dirty="0"/>
+              <a:t> de </a:t>
+            </a:r>
+            <a:r>
+              <a:rPr lang="en-GB" dirty="0" err="1"/>
+              <a:t>Aplicações</a:t>
+            </a:r>
+            <a:r>
+              <a:rPr lang="en-GB" dirty="0"/>
+              <a:t> e de </a:t>
+            </a:r>
+            <a:r>
+              <a:rPr lang="en-GB" dirty="0" err="1"/>
+              <a:t>Programação</a:t>
+            </a:r>
+            <a:r>
+              <a:rPr lang="en-GB" dirty="0"/>
+              <a:t> para a WEB – </a:t>
+            </a:r>
+            <a:r>
+              <a:rPr lang="en-GB" dirty="0" err="1"/>
+              <a:t>Servidor</a:t>
+            </a:r>
+            <a:r>
+              <a:rPr lang="en-GB" dirty="0"/>
+              <a:t> </a:t>
+            </a:r>
+            <a:r>
+              <a:rPr lang="en-GB" dirty="0" err="1"/>
+              <a:t>através</a:t>
+            </a:r>
+            <a:r>
+              <a:rPr lang="en-GB" dirty="0"/>
+              <a:t> de </a:t>
+            </a:r>
+            <a:r>
+              <a:rPr lang="en-GB" dirty="0" err="1"/>
+              <a:t>Metodologias</a:t>
+            </a:r>
+            <a:r>
+              <a:rPr lang="en-GB" dirty="0"/>
+              <a:t> de </a:t>
+            </a:r>
+            <a:r>
+              <a:rPr lang="en-GB" dirty="0" err="1"/>
+              <a:t>Desenvolvimento</a:t>
+            </a:r>
+            <a:r>
+              <a:rPr lang="en-GB" dirty="0"/>
+              <a:t> </a:t>
+            </a:r>
+            <a:r>
+              <a:rPr lang="en-GB" dirty="0" err="1"/>
+              <a:t>Ágies</a:t>
+            </a:r>
+            <a:r>
+              <a:rPr lang="en-GB" dirty="0"/>
+              <a:t> e a </a:t>
+            </a:r>
+            <a:r>
+              <a:rPr lang="en-GB" dirty="0" err="1"/>
+              <a:t>Metodologia</a:t>
+            </a:r>
+            <a:r>
+              <a:rPr lang="en-GB" dirty="0"/>
+              <a:t> de SCRUM.</a:t>
+            </a:r>
+          </a:p>
+          <a:p>
+            <a:endParaRPr lang="en-GB" dirty="0"/>
           </a:p>
         </p:txBody>
       </p:sp>
@@ -5719,7 +5884,7 @@
             </a:r>
             <a:r>
               <a:rPr lang="en-GB" dirty="0"/>
-              <a:t>  de PWCS </a:t>
+              <a:t>  de PWS </a:t>
             </a:r>
           </a:p>
           <a:p>
@@ -5995,13 +6160,13 @@
   <p:clrMapOvr>
     <a:masterClrMapping/>
   </p:clrMapOvr>
-  <mc:AlternateContent xmlns:mc="http://schemas.openxmlformats.org/markup-compatibility/2006">
-    <mc:Choice xmlns:p14="http://schemas.microsoft.com/office/powerpoint/2010/main" Requires="p14">
+  <mc:AlternateContent xmlns:mc="http://schemas.openxmlformats.org/markup-compatibility/2006" xmlns:p14="http://schemas.microsoft.com/office/powerpoint/2010/main">
+    <mc:Choice Requires="p14">
       <p:transition spd="slow" p14:dur="3400">
         <p14:reveal/>
       </p:transition>
     </mc:Choice>
-    <mc:Fallback>
+    <mc:Fallback xmlns="">
       <p:transition spd="slow">
         <p:fade/>
       </p:transition>

</xml_diff>